<commit_message>
Prcedural Street PowerPoint Finished?
</commit_message>
<xml_diff>
--- a/Programmation/ProceduralStreet/ProceduralStreet.pptx
+++ b/Programmation/ProceduralStreet/ProceduralStreet.pptx
@@ -8,6 +8,7 @@
     <p:sldId id="256" r:id="rId2"/>
     <p:sldId id="257" r:id="rId3"/>
     <p:sldId id="258" r:id="rId4"/>
+    <p:sldId id="259" r:id="rId5"/>
   </p:sldIdLst>
   <p:sldSz cx="12192000" cy="6858000"/>
   <p:notesSz cx="6858000" cy="9144000"/>
@@ -245,7 +246,7 @@
           <a:p>
             <a:fld id="{224476F3-966E-4AD5-BDF6-2EBD8D1BF08A}" type="datetimeFigureOut">
               <a:rPr lang="fr-FR" smtClean="0"/>
-              <a:t>05/01/2018</a:t>
+              <a:t>06/01/2018</a:t>
             </a:fld>
             <a:endParaRPr lang="fr-FR"/>
           </a:p>
@@ -415,7 +416,7 @@
           <a:p>
             <a:fld id="{224476F3-966E-4AD5-BDF6-2EBD8D1BF08A}" type="datetimeFigureOut">
               <a:rPr lang="fr-FR" smtClean="0"/>
-              <a:t>05/01/2018</a:t>
+              <a:t>06/01/2018</a:t>
             </a:fld>
             <a:endParaRPr lang="fr-FR"/>
           </a:p>
@@ -595,7 +596,7 @@
           <a:p>
             <a:fld id="{224476F3-966E-4AD5-BDF6-2EBD8D1BF08A}" type="datetimeFigureOut">
               <a:rPr lang="fr-FR" smtClean="0"/>
-              <a:t>05/01/2018</a:t>
+              <a:t>06/01/2018</a:t>
             </a:fld>
             <a:endParaRPr lang="fr-FR"/>
           </a:p>
@@ -765,7 +766,7 @@
           <a:p>
             <a:fld id="{224476F3-966E-4AD5-BDF6-2EBD8D1BF08A}" type="datetimeFigureOut">
               <a:rPr lang="fr-FR" smtClean="0"/>
-              <a:t>05/01/2018</a:t>
+              <a:t>06/01/2018</a:t>
             </a:fld>
             <a:endParaRPr lang="fr-FR"/>
           </a:p>
@@ -1011,7 +1012,7 @@
           <a:p>
             <a:fld id="{224476F3-966E-4AD5-BDF6-2EBD8D1BF08A}" type="datetimeFigureOut">
               <a:rPr lang="fr-FR" smtClean="0"/>
-              <a:t>05/01/2018</a:t>
+              <a:t>06/01/2018</a:t>
             </a:fld>
             <a:endParaRPr lang="fr-FR"/>
           </a:p>
@@ -1243,7 +1244,7 @@
           <a:p>
             <a:fld id="{224476F3-966E-4AD5-BDF6-2EBD8D1BF08A}" type="datetimeFigureOut">
               <a:rPr lang="fr-FR" smtClean="0"/>
-              <a:t>05/01/2018</a:t>
+              <a:t>06/01/2018</a:t>
             </a:fld>
             <a:endParaRPr lang="fr-FR"/>
           </a:p>
@@ -1610,7 +1611,7 @@
           <a:p>
             <a:fld id="{224476F3-966E-4AD5-BDF6-2EBD8D1BF08A}" type="datetimeFigureOut">
               <a:rPr lang="fr-FR" smtClean="0"/>
-              <a:t>05/01/2018</a:t>
+              <a:t>06/01/2018</a:t>
             </a:fld>
             <a:endParaRPr lang="fr-FR"/>
           </a:p>
@@ -1728,7 +1729,7 @@
           <a:p>
             <a:fld id="{224476F3-966E-4AD5-BDF6-2EBD8D1BF08A}" type="datetimeFigureOut">
               <a:rPr lang="fr-FR" smtClean="0"/>
-              <a:t>05/01/2018</a:t>
+              <a:t>06/01/2018</a:t>
             </a:fld>
             <a:endParaRPr lang="fr-FR"/>
           </a:p>
@@ -1823,7 +1824,7 @@
           <a:p>
             <a:fld id="{224476F3-966E-4AD5-BDF6-2EBD8D1BF08A}" type="datetimeFigureOut">
               <a:rPr lang="fr-FR" smtClean="0"/>
-              <a:t>05/01/2018</a:t>
+              <a:t>06/01/2018</a:t>
             </a:fld>
             <a:endParaRPr lang="fr-FR"/>
           </a:p>
@@ -2100,7 +2101,7 @@
           <a:p>
             <a:fld id="{224476F3-966E-4AD5-BDF6-2EBD8D1BF08A}" type="datetimeFigureOut">
               <a:rPr lang="fr-FR" smtClean="0"/>
-              <a:t>05/01/2018</a:t>
+              <a:t>06/01/2018</a:t>
             </a:fld>
             <a:endParaRPr lang="fr-FR"/>
           </a:p>
@@ -2353,7 +2354,7 @@
           <a:p>
             <a:fld id="{224476F3-966E-4AD5-BDF6-2EBD8D1BF08A}" type="datetimeFigureOut">
               <a:rPr lang="fr-FR" smtClean="0"/>
-              <a:t>05/01/2018</a:t>
+              <a:t>06/01/2018</a:t>
             </a:fld>
             <a:endParaRPr lang="fr-FR"/>
           </a:p>
@@ -2566,7 +2567,7 @@
           <a:p>
             <a:fld id="{224476F3-966E-4AD5-BDF6-2EBD8D1BF08A}" type="datetimeFigureOut">
               <a:rPr lang="fr-FR" smtClean="0"/>
-              <a:t>05/01/2018</a:t>
+              <a:t>06/01/2018</a:t>
             </a:fld>
             <a:endParaRPr lang="fr-FR"/>
           </a:p>
@@ -3078,6 +3079,13 @@
   <p:clrMapOvr>
     <a:masterClrMapping/>
   </p:clrMapOvr>
+  <p:timing>
+    <p:tnLst>
+      <p:par>
+        <p:cTn id="1" dur="indefinite" restart="never" nodeType="tmRoot"/>
+      </p:par>
+    </p:tnLst>
+  </p:timing>
 </p:sld>
 </file>
 
@@ -3120,11 +3128,11 @@
           <a:p>
             <a:r>
               <a:rPr lang="fr-FR" dirty="0" err="1" smtClean="0"/>
-              <a:t>Procedural</a:t>
+              <a:t>Perlin</a:t>
             </a:r>
             <a:r>
               <a:rPr lang="fr-FR" dirty="0" smtClean="0"/>
-              <a:t> Street</a:t>
+              <a:t> Noise</a:t>
             </a:r>
             <a:endParaRPr lang="fr-FR" dirty="0"/>
           </a:p>
@@ -3157,6 +3165,16 @@
           <a:prstGeom prst="rect">
             <a:avLst/>
           </a:prstGeom>
+          <a:ln>
+            <a:noFill/>
+          </a:ln>
+          <a:effectLst>
+            <a:outerShdw blurRad="292100" dist="139700" dir="2700000" algn="tl" rotWithShape="0">
+              <a:srgbClr val="333333">
+                <a:alpha val="65000"/>
+              </a:srgbClr>
+            </a:outerShdw>
+          </a:effectLst>
         </p:spPr>
       </p:pic>
       <p:pic>
@@ -3187,6 +3205,16 @@
           <a:prstGeom prst="rect">
             <a:avLst/>
           </a:prstGeom>
+          <a:ln>
+            <a:noFill/>
+          </a:ln>
+          <a:effectLst>
+            <a:outerShdw blurRad="292100" dist="139700" dir="2700000" algn="tl" rotWithShape="0">
+              <a:srgbClr val="333333">
+                <a:alpha val="65000"/>
+              </a:srgbClr>
+            </a:outerShdw>
+          </a:effectLst>
         </p:spPr>
       </p:pic>
       <p:sp>
@@ -3311,6 +3339,46 @@
           </a:p>
         </p:txBody>
       </p:sp>
+      <p:pic>
+        <p:nvPicPr>
+          <p:cNvPr id="4" name="Image 3"/>
+          <p:cNvPicPr>
+            <a:picLocks noChangeAspect="1"/>
+          </p:cNvPicPr>
+          <p:nvPr/>
+        </p:nvPicPr>
+        <p:blipFill>
+          <a:blip r:embed="rId4">
+            <a:extLst>
+              <a:ext uri="{28A0092B-C50C-407E-A947-70E740481C1C}">
+                <a14:useLocalDpi xmlns:a14="http://schemas.microsoft.com/office/drawing/2010/main" val="0"/>
+              </a:ext>
+            </a:extLst>
+          </a:blip>
+          <a:stretch>
+            <a:fillRect/>
+          </a:stretch>
+        </p:blipFill>
+        <p:spPr>
+          <a:xfrm>
+            <a:off x="3930528" y="120730"/>
+            <a:ext cx="5239481" cy="1609950"/>
+          </a:xfrm>
+          <a:prstGeom prst="rect">
+            <a:avLst/>
+          </a:prstGeom>
+          <a:ln>
+            <a:noFill/>
+          </a:ln>
+          <a:effectLst>
+            <a:outerShdw blurRad="292100" dist="139700" dir="2700000" algn="tl" rotWithShape="0">
+              <a:srgbClr val="333333">
+                <a:alpha val="65000"/>
+              </a:srgbClr>
+            </a:outerShdw>
+          </a:effectLst>
+        </p:spPr>
+      </p:pic>
     </p:spTree>
     <p:extLst>
       <p:ext uri="{BB962C8B-B14F-4D97-AF65-F5344CB8AC3E}">
@@ -3369,12 +3437,12 @@
           <a:lstStyle/>
           <a:p>
             <a:r>
+              <a:rPr lang="fr-FR" dirty="0" smtClean="0"/>
+              <a:t>Building </a:t>
+            </a:r>
+            <a:r>
               <a:rPr lang="fr-FR" dirty="0" err="1" smtClean="0"/>
-              <a:t>Procedural</a:t>
-            </a:r>
-            <a:r>
-              <a:rPr lang="fr-FR" dirty="0" smtClean="0"/>
-              <a:t> Street</a:t>
+              <a:t>streets</a:t>
             </a:r>
             <a:endParaRPr lang="fr-FR" dirty="0"/>
           </a:p>
@@ -3408,6 +3476,16 @@
           <a:prstGeom prst="rect">
             <a:avLst/>
           </a:prstGeom>
+          <a:ln>
+            <a:noFill/>
+          </a:ln>
+          <a:effectLst>
+            <a:outerShdw blurRad="292100" dist="139700" dir="2700000" algn="tl" rotWithShape="0">
+              <a:srgbClr val="333333">
+                <a:alpha val="65000"/>
+              </a:srgbClr>
+            </a:outerShdw>
+          </a:effectLst>
         </p:spPr>
       </p:pic>
       <p:pic>
@@ -3438,6 +3516,16 @@
           <a:prstGeom prst="rect">
             <a:avLst/>
           </a:prstGeom>
+          <a:ln>
+            <a:noFill/>
+          </a:ln>
+          <a:effectLst>
+            <a:outerShdw blurRad="292100" dist="139700" dir="2700000" algn="tl" rotWithShape="0">
+              <a:srgbClr val="333333">
+                <a:alpha val="65000"/>
+              </a:srgbClr>
+            </a:outerShdw>
+          </a:effectLst>
         </p:spPr>
       </p:pic>
       <p:sp>
@@ -3508,6 +3596,16 @@
           <a:prstGeom prst="rect">
             <a:avLst/>
           </a:prstGeom>
+          <a:ln>
+            <a:noFill/>
+          </a:ln>
+          <a:effectLst>
+            <a:outerShdw blurRad="292100" dist="139700" dir="2700000" algn="tl" rotWithShape="0">
+              <a:srgbClr val="333333">
+                <a:alpha val="65000"/>
+              </a:srgbClr>
+            </a:outerShdw>
+          </a:effectLst>
         </p:spPr>
       </p:pic>
       <p:sp>
@@ -3560,6 +3658,119 @@
   <p:clrMapOvr>
     <a:masterClrMapping/>
   </p:clrMapOvr>
+  <p:timing>
+    <p:tnLst>
+      <p:par>
+        <p:cTn id="1" dur="indefinite" restart="never" nodeType="tmRoot"/>
+      </p:par>
+    </p:tnLst>
+  </p:timing>
+</p:sld>
+</file>
+
+<file path=ppt/slides/slide4.xml><?xml version="1.0" encoding="utf-8"?>
+<p:sld xmlns:a="http://schemas.openxmlformats.org/drawingml/2006/main" xmlns:r="http://schemas.openxmlformats.org/officeDocument/2006/relationships" xmlns:p="http://schemas.openxmlformats.org/presentationml/2006/main">
+  <p:cSld>
+    <p:spTree>
+      <p:nvGrpSpPr>
+        <p:cNvPr id="1" name=""/>
+        <p:cNvGrpSpPr/>
+        <p:nvPr/>
+      </p:nvGrpSpPr>
+      <p:grpSpPr>
+        <a:xfrm>
+          <a:off x="0" y="0"/>
+          <a:ext cx="0" cy="0"/>
+          <a:chOff x="0" y="0"/>
+          <a:chExt cx="0" cy="0"/>
+        </a:xfrm>
+      </p:grpSpPr>
+      <p:sp>
+        <p:nvSpPr>
+          <p:cNvPr id="2" name="Titre 1"/>
+          <p:cNvSpPr>
+            <a:spLocks noGrp="1"/>
+          </p:cNvSpPr>
+          <p:nvPr>
+            <p:ph type="title"/>
+          </p:nvPr>
+        </p:nvSpPr>
+        <p:spPr/>
+        <p:txBody>
+          <a:bodyPr/>
+          <a:lstStyle/>
+          <a:p>
+            <a:r>
+              <a:rPr lang="fr-FR" dirty="0" err="1" smtClean="0"/>
+              <a:t>Generating</a:t>
+            </a:r>
+            <a:r>
+              <a:rPr lang="fr-FR" dirty="0" smtClean="0"/>
+              <a:t> the city</a:t>
+            </a:r>
+            <a:endParaRPr lang="fr-FR" dirty="0"/>
+          </a:p>
+        </p:txBody>
+      </p:sp>
+      <p:pic>
+        <p:nvPicPr>
+          <p:cNvPr id="4" name="Espace réservé du contenu 3"/>
+          <p:cNvPicPr>
+            <a:picLocks noGrp="1" noChangeAspect="1"/>
+          </p:cNvPicPr>
+          <p:nvPr>
+            <p:ph idx="1"/>
+          </p:nvPr>
+        </p:nvPicPr>
+        <p:blipFill>
+          <a:blip r:embed="rId2">
+            <a:extLst>
+              <a:ext uri="{28A0092B-C50C-407E-A947-70E740481C1C}">
+                <a14:useLocalDpi xmlns:a14="http://schemas.microsoft.com/office/drawing/2010/main" val="0"/>
+              </a:ext>
+            </a:extLst>
+          </a:blip>
+          <a:stretch>
+            <a:fillRect/>
+          </a:stretch>
+        </p:blipFill>
+        <p:spPr>
+          <a:xfrm>
+            <a:off x="3262934" y="1825625"/>
+            <a:ext cx="5666131" cy="4351338"/>
+          </a:xfrm>
+          <a:prstGeom prst="rect">
+            <a:avLst/>
+          </a:prstGeom>
+          <a:ln>
+            <a:noFill/>
+          </a:ln>
+          <a:effectLst>
+            <a:outerShdw blurRad="292100" dist="139700" dir="2700000" algn="tl" rotWithShape="0">
+              <a:srgbClr val="333333">
+                <a:alpha val="65000"/>
+              </a:srgbClr>
+            </a:outerShdw>
+          </a:effectLst>
+        </p:spPr>
+      </p:pic>
+    </p:spTree>
+    <p:extLst>
+      <p:ext uri="{BB962C8B-B14F-4D97-AF65-F5344CB8AC3E}">
+        <p14:creationId xmlns:p14="http://schemas.microsoft.com/office/powerpoint/2010/main" val="2421344557"/>
+      </p:ext>
+    </p:extLst>
+  </p:cSld>
+  <p:clrMapOvr>
+    <a:masterClrMapping/>
+  </p:clrMapOvr>
+  <p:timing>
+    <p:tnLst>
+      <p:par>
+        <p:cTn id="1" dur="indefinite" restart="never" nodeType="tmRoot"/>
+      </p:par>
+    </p:tnLst>
+  </p:timing>
 </p:sld>
 </file>
 

</xml_diff>